<commit_message>
dodao film o omotacima primitivnih tipova
</commit_message>
<xml_diff>
--- a/predavanja/prezentacije/OOP07-1-Predefinisani tipovi u Javi.pptx
+++ b/predavanja/prezentacije/OOP07-1-Predefinisani tipovi u Javi.pptx
@@ -5,10 +5,10 @@
     <p:sldMasterId id="2147483721" r:id="rId1"/>
   </p:sldMasterIdLst>
   <p:notesMasterIdLst>
-    <p:notesMasterId r:id="rId25"/>
+    <p:notesMasterId r:id="rId27"/>
   </p:notesMasterIdLst>
   <p:handoutMasterIdLst>
-    <p:handoutMasterId r:id="rId26"/>
+    <p:handoutMasterId r:id="rId28"/>
   </p:handoutMasterIdLst>
   <p:sldIdLst>
     <p:sldId id="284" r:id="rId2"/>
@@ -30,19 +30,21 @@
     <p:sldId id="297" r:id="rId18"/>
     <p:sldId id="298" r:id="rId19"/>
     <p:sldId id="299" r:id="rId20"/>
-    <p:sldId id="300" r:id="rId21"/>
-    <p:sldId id="302" r:id="rId22"/>
-    <p:sldId id="303" r:id="rId23"/>
-    <p:sldId id="283" r:id="rId24"/>
+    <p:sldId id="306" r:id="rId21"/>
+    <p:sldId id="300" r:id="rId22"/>
+    <p:sldId id="307" r:id="rId23"/>
+    <p:sldId id="302" r:id="rId24"/>
+    <p:sldId id="303" r:id="rId25"/>
+    <p:sldId id="283" r:id="rId26"/>
   </p:sldIdLst>
   <p:sldSz cx="9144000" cy="6858000" type="screen4x3"/>
   <p:notesSz cx="6858000" cy="9144000"/>
   <p:embeddedFontLst>
     <p:embeddedFont>
       <p:font typeface="Garamond" panose="02020404030301010803" pitchFamily="18" charset="0"/>
-      <p:regular r:id="rId27"/>
-      <p:bold r:id="rId28"/>
-      <p:italic r:id="rId29"/>
+      <p:regular r:id="rId29"/>
+      <p:bold r:id="rId30"/>
+      <p:italic r:id="rId31"/>
     </p:embeddedFont>
   </p:embeddedFontLst>
   <p:kinsoku lang="ja-JP" invalStChars="、。，．・：；？！゛゜ヽヾゝゞ々ー’”）〕］｝〉》」』】°‰′″℃￠％ぁぃぅぇぉっゃゅょゎァィゥェォッャュョヮヵヶ!%),.:;?]}｡｣､･ｧｨｩｪｫｬｭｮｯｰﾞﾟ" invalEndChars="‘“（〔［｛〈《「『【￥＄$([\{｢￡"/>
@@ -17579,6 +17581,419 @@
       </p:grpSpPr>
       <p:sp>
         <p:nvSpPr>
+          <p:cNvPr id="4098" name="Rectangle 2"/>
+          <p:cNvSpPr>
+            <a:spLocks noGrp="1" noChangeArrowheads="1"/>
+          </p:cNvSpPr>
+          <p:nvPr>
+            <p:ph type="ctrTitle"/>
+          </p:nvPr>
+        </p:nvSpPr>
+        <p:spPr>
+          <a:xfrm>
+            <a:off x="395288" y="1628775"/>
+            <a:ext cx="8569325" cy="1144588"/>
+          </a:xfrm>
+        </p:spPr>
+        <p:txBody>
+          <a:bodyPr/>
+          <a:lstStyle/>
+          <a:p>
+            <a:pPr eaLnBrk="1" hangingPunct="1"/>
+            <a:r>
+              <a:rPr lang="sr-Cyrl-RS" altLang="en-US" sz="5400" dirty="0" smtClean="0">
+                <a:solidFill>
+                  <a:srgbClr val="3366FF"/>
+                </a:solidFill>
+              </a:rPr>
+              <a:t>Предефинисани </a:t>
+            </a:r>
+            <a:r>
+              <a:rPr lang="en-US" altLang="en-US" sz="5400" dirty="0" smtClean="0">
+                <a:solidFill>
+                  <a:srgbClr val="3366FF"/>
+                </a:solidFill>
+              </a:rPr>
+              <a:t/>
+            </a:r>
+            <a:br>
+              <a:rPr lang="en-US" altLang="en-US" sz="5400" dirty="0" smtClean="0">
+                <a:solidFill>
+                  <a:srgbClr val="3366FF"/>
+                </a:solidFill>
+              </a:rPr>
+            </a:br>
+            <a:r>
+              <a:rPr lang="sr-Cyrl-RS" altLang="en-US" sz="5400" dirty="0" smtClean="0">
+                <a:solidFill>
+                  <a:srgbClr val="3366FF"/>
+                </a:solidFill>
+              </a:rPr>
+              <a:t>типови и објекти </a:t>
+            </a:r>
+            <a:br>
+              <a:rPr lang="sr-Cyrl-RS" altLang="en-US" sz="5400" dirty="0" smtClean="0">
+                <a:solidFill>
+                  <a:srgbClr val="3366FF"/>
+                </a:solidFill>
+              </a:rPr>
+            </a:br>
+            <a:r>
+              <a:rPr lang="sr-Cyrl-RS" altLang="en-US" sz="5400" dirty="0" smtClean="0">
+                <a:solidFill>
+                  <a:srgbClr val="3366FF"/>
+                </a:solidFill>
+              </a:rPr>
+              <a:t>у програмском језику Јава</a:t>
+            </a:r>
+            <a:endParaRPr lang="sr-Latn-CS" altLang="en-US" sz="5400" dirty="0" smtClean="0">
+              <a:solidFill>
+                <a:srgbClr val="3366FF"/>
+              </a:solidFill>
+            </a:endParaRPr>
+          </a:p>
+        </p:txBody>
+      </p:sp>
+      <p:sp>
+        <p:nvSpPr>
+          <p:cNvPr id="5" name="Rectangle 3"/>
+          <p:cNvSpPr txBox="1">
+            <a:spLocks noChangeArrowheads="1"/>
+          </p:cNvSpPr>
+          <p:nvPr/>
+        </p:nvSpPr>
+        <p:spPr bwMode="auto">
+          <a:xfrm>
+            <a:off x="3563888" y="3356992"/>
+            <a:ext cx="5110162" cy="1752600"/>
+          </a:xfrm>
+          <a:prstGeom prst="rect">
+            <a:avLst/>
+          </a:prstGeom>
+          <a:noFill/>
+          <a:ln>
+            <a:noFill/>
+          </a:ln>
+          <a:extLst>
+            <a:ext uri="{909E8E84-426E-40DD-AFC4-6F175D3DCCD1}">
+              <a14:hiddenFill xmlns:a14="http://schemas.microsoft.com/office/drawing/2010/main">
+                <a:solidFill>
+                  <a:srgbClr val="FFFFFF"/>
+                </a:solidFill>
+              </a14:hiddenFill>
+            </a:ext>
+            <a:ext uri="{91240B29-F687-4F45-9708-019B960494DF}">
+              <a14:hiddenLine xmlns:a14="http://schemas.microsoft.com/office/drawing/2010/main" w="9525">
+                <a:solidFill>
+                  <a:srgbClr val="000000"/>
+                </a:solidFill>
+                <a:miter lim="800000"/>
+                <a:headEnd/>
+                <a:tailEnd/>
+              </a14:hiddenLine>
+            </a:ext>
+          </a:extLst>
+        </p:spPr>
+        <p:txBody>
+          <a:bodyPr vert="horz" wrap="square" lIns="91440" tIns="45720" rIns="91440" bIns="45720" numCol="1" anchor="t" anchorCtr="0" compatLnSpc="1">
+            <a:prstTxWarp prst="textNoShape">
+              <a:avLst/>
+            </a:prstTxWarp>
+          </a:bodyPr>
+          <a:lstStyle>
+            <a:lvl1pPr marL="0" indent="0" algn="r" rtl="0" eaLnBrk="0" fontAlgn="base" hangingPunct="0">
+              <a:spcBef>
+                <a:spcPct val="20000"/>
+              </a:spcBef>
+              <a:spcAft>
+                <a:spcPct val="0"/>
+              </a:spcAft>
+              <a:buClr>
+                <a:schemeClr val="accent1"/>
+              </a:buClr>
+              <a:buFont typeface="Wingdings" panose="05000000000000000000" pitchFamily="2" charset="2"/>
+              <a:buNone/>
+              <a:defRPr sz="3200">
+                <a:solidFill>
+                  <a:schemeClr val="tx1"/>
+                </a:solidFill>
+                <a:latin typeface="+mn-lt"/>
+                <a:ea typeface="+mn-ea"/>
+                <a:cs typeface="+mn-cs"/>
+              </a:defRPr>
+            </a:lvl1pPr>
+            <a:lvl2pPr marL="742950" indent="-285750" algn="l" rtl="0" eaLnBrk="0" fontAlgn="base" hangingPunct="0">
+              <a:spcBef>
+                <a:spcPct val="20000"/>
+              </a:spcBef>
+              <a:spcAft>
+                <a:spcPct val="0"/>
+              </a:spcAft>
+              <a:buClr>
+                <a:schemeClr val="accent1"/>
+              </a:buClr>
+              <a:buFont typeface="Wingdings" panose="05000000000000000000" pitchFamily="2" charset="2"/>
+              <a:buChar char="¡"/>
+              <a:defRPr sz="2700">
+                <a:solidFill>
+                  <a:schemeClr val="tx1"/>
+                </a:solidFill>
+                <a:latin typeface="+mn-lt"/>
+              </a:defRPr>
+            </a:lvl2pPr>
+            <a:lvl3pPr marL="1143000" indent="-228600" algn="l" rtl="0" eaLnBrk="0" fontAlgn="base" hangingPunct="0">
+              <a:spcBef>
+                <a:spcPct val="20000"/>
+              </a:spcBef>
+              <a:spcAft>
+                <a:spcPct val="0"/>
+              </a:spcAft>
+              <a:buClr>
+                <a:schemeClr val="accent1"/>
+              </a:buClr>
+              <a:buFont typeface="Wingdings" panose="05000000000000000000" pitchFamily="2" charset="2"/>
+              <a:buChar char="l"/>
+              <a:defRPr sz="2300">
+                <a:solidFill>
+                  <a:schemeClr val="tx1"/>
+                </a:solidFill>
+                <a:latin typeface="+mn-lt"/>
+              </a:defRPr>
+            </a:lvl3pPr>
+            <a:lvl4pPr marL="1600200" indent="-228600" algn="l" rtl="0" eaLnBrk="0" fontAlgn="base" hangingPunct="0">
+              <a:spcBef>
+                <a:spcPct val="20000"/>
+              </a:spcBef>
+              <a:spcAft>
+                <a:spcPct val="0"/>
+              </a:spcAft>
+              <a:buClr>
+                <a:schemeClr val="accent1"/>
+              </a:buClr>
+              <a:buChar char="•"/>
+              <a:defRPr sz="2000">
+                <a:solidFill>
+                  <a:schemeClr val="tx1"/>
+                </a:solidFill>
+                <a:latin typeface="+mn-lt"/>
+              </a:defRPr>
+            </a:lvl4pPr>
+            <a:lvl5pPr marL="2057400" indent="-228600" algn="l" rtl="0" eaLnBrk="0" fontAlgn="base" hangingPunct="0">
+              <a:spcBef>
+                <a:spcPct val="20000"/>
+              </a:spcBef>
+              <a:spcAft>
+                <a:spcPct val="0"/>
+              </a:spcAft>
+              <a:buClr>
+                <a:schemeClr val="accent1"/>
+              </a:buClr>
+              <a:buFont typeface="Wingdings" panose="05000000000000000000" pitchFamily="2" charset="2"/>
+              <a:buChar char=""/>
+              <a:defRPr sz="2000">
+                <a:solidFill>
+                  <a:schemeClr val="tx1"/>
+                </a:solidFill>
+                <a:latin typeface="+mn-lt"/>
+              </a:defRPr>
+            </a:lvl5pPr>
+            <a:lvl6pPr marL="2514600" indent="-228600" algn="l" rtl="0" fontAlgn="base">
+              <a:spcBef>
+                <a:spcPct val="20000"/>
+              </a:spcBef>
+              <a:spcAft>
+                <a:spcPct val="0"/>
+              </a:spcAft>
+              <a:buClr>
+                <a:schemeClr val="accent1"/>
+              </a:buClr>
+              <a:buFont typeface="Wingdings" pitchFamily="2" charset="2"/>
+              <a:buChar char=""/>
+              <a:defRPr sz="2000">
+                <a:solidFill>
+                  <a:schemeClr val="tx1"/>
+                </a:solidFill>
+                <a:latin typeface="+mn-lt"/>
+              </a:defRPr>
+            </a:lvl6pPr>
+            <a:lvl7pPr marL="2971800" indent="-228600" algn="l" rtl="0" fontAlgn="base">
+              <a:spcBef>
+                <a:spcPct val="20000"/>
+              </a:spcBef>
+              <a:spcAft>
+                <a:spcPct val="0"/>
+              </a:spcAft>
+              <a:buClr>
+                <a:schemeClr val="accent1"/>
+              </a:buClr>
+              <a:buFont typeface="Wingdings" pitchFamily="2" charset="2"/>
+              <a:buChar char=""/>
+              <a:defRPr sz="2000">
+                <a:solidFill>
+                  <a:schemeClr val="tx1"/>
+                </a:solidFill>
+                <a:latin typeface="+mn-lt"/>
+              </a:defRPr>
+            </a:lvl7pPr>
+            <a:lvl8pPr marL="3429000" indent="-228600" algn="l" rtl="0" fontAlgn="base">
+              <a:spcBef>
+                <a:spcPct val="20000"/>
+              </a:spcBef>
+              <a:spcAft>
+                <a:spcPct val="0"/>
+              </a:spcAft>
+              <a:buClr>
+                <a:schemeClr val="accent1"/>
+              </a:buClr>
+              <a:buFont typeface="Wingdings" pitchFamily="2" charset="2"/>
+              <a:buChar char=""/>
+              <a:defRPr sz="2000">
+                <a:solidFill>
+                  <a:schemeClr val="tx1"/>
+                </a:solidFill>
+                <a:latin typeface="+mn-lt"/>
+              </a:defRPr>
+            </a:lvl8pPr>
+            <a:lvl9pPr marL="3886200" indent="-228600" algn="l" rtl="0" fontAlgn="base">
+              <a:spcBef>
+                <a:spcPct val="20000"/>
+              </a:spcBef>
+              <a:spcAft>
+                <a:spcPct val="0"/>
+              </a:spcAft>
+              <a:buClr>
+                <a:schemeClr val="accent1"/>
+              </a:buClr>
+              <a:buFont typeface="Wingdings" pitchFamily="2" charset="2"/>
+              <a:buChar char=""/>
+              <a:defRPr sz="2000">
+                <a:solidFill>
+                  <a:schemeClr val="tx1"/>
+                </a:solidFill>
+                <a:latin typeface="+mn-lt"/>
+              </a:defRPr>
+            </a:lvl9pPr>
+          </a:lstStyle>
+          <a:p>
+            <a:pPr eaLnBrk="1" hangingPunct="1"/>
+            <a:r>
+              <a:rPr lang="sr-Cyrl-RS" altLang="en-US" kern="0" dirty="0" smtClean="0">
+                <a:solidFill>
+                  <a:srgbClr val="993300"/>
+                </a:solidFill>
+                <a:latin typeface="Times New Roman" panose="02020603050405020304" pitchFamily="18" charset="0"/>
+                <a:cs typeface="Times New Roman" panose="02020603050405020304" pitchFamily="18" charset="0"/>
+              </a:rPr>
+              <a:t>Владимир Филиповић</a:t>
+            </a:r>
+            <a:endParaRPr lang="en-US" altLang="en-US" kern="0" dirty="0" smtClean="0">
+              <a:solidFill>
+                <a:srgbClr val="993300"/>
+              </a:solidFill>
+              <a:latin typeface="Times New Roman" panose="02020603050405020304" pitchFamily="18" charset="0"/>
+              <a:cs typeface="Times New Roman" panose="02020603050405020304" pitchFamily="18" charset="0"/>
+            </a:endParaRPr>
+          </a:p>
+          <a:p>
+            <a:pPr eaLnBrk="1" hangingPunct="1"/>
+            <a:r>
+              <a:rPr lang="sr-Latn-CS" altLang="en-US" kern="0" dirty="0" smtClean="0">
+                <a:hlinkClick r:id="rId2"/>
+              </a:rPr>
+              <a:t>vladaf@matf.bg.ac.</a:t>
+            </a:r>
+            <a:r>
+              <a:rPr lang="en-US" altLang="en-US" kern="0" dirty="0" err="1" smtClean="0">
+                <a:hlinkClick r:id="rId2"/>
+              </a:rPr>
+              <a:t>rs</a:t>
+            </a:r>
+            <a:endParaRPr lang="sr-Latn-RS" altLang="en-US" kern="0" dirty="0" smtClean="0"/>
+          </a:p>
+          <a:p>
+            <a:pPr eaLnBrk="1" hangingPunct="1"/>
+            <a:r>
+              <a:rPr lang="sr-Cyrl-RS" altLang="en-US" kern="0" dirty="0" smtClean="0">
+                <a:solidFill>
+                  <a:srgbClr val="993300"/>
+                </a:solidFill>
+                <a:latin typeface="Times New Roman" panose="02020603050405020304" pitchFamily="18" charset="0"/>
+                <a:cs typeface="Times New Roman" panose="02020603050405020304" pitchFamily="18" charset="0"/>
+              </a:rPr>
+              <a:t>Александар Картељ</a:t>
+            </a:r>
+            <a:endParaRPr lang="en-US" altLang="en-US" kern="0" dirty="0" smtClean="0">
+              <a:solidFill>
+                <a:srgbClr val="993300"/>
+              </a:solidFill>
+              <a:latin typeface="Times New Roman" panose="02020603050405020304" pitchFamily="18" charset="0"/>
+              <a:cs typeface="Times New Roman" panose="02020603050405020304" pitchFamily="18" charset="0"/>
+            </a:endParaRPr>
+          </a:p>
+          <a:p>
+            <a:pPr eaLnBrk="1" hangingPunct="1"/>
+            <a:r>
+              <a:rPr lang="en-US" altLang="en-US" kern="0" dirty="0" smtClean="0">
+                <a:hlinkClick r:id="rId3"/>
+              </a:rPr>
+              <a:t>k</a:t>
+            </a:r>
+            <a:r>
+              <a:rPr lang="sr-Latn-RS" altLang="en-US" kern="0" dirty="0" smtClean="0">
+                <a:hlinkClick r:id="rId3"/>
+              </a:rPr>
+              <a:t>artelj</a:t>
+            </a:r>
+            <a:r>
+              <a:rPr lang="en-US" altLang="en-US" kern="0" dirty="0" smtClean="0">
+                <a:hlinkClick r:id="rId3"/>
+              </a:rPr>
+              <a:t>@matf.bg.ac.rs</a:t>
+            </a:r>
+            <a:endParaRPr lang="en-US" altLang="en-US" kern="0" dirty="0"/>
+          </a:p>
+        </p:txBody>
+      </p:sp>
+    </p:spTree>
+    <p:extLst>
+      <p:ext uri="{BB962C8B-B14F-4D97-AF65-F5344CB8AC3E}">
+        <p14:creationId xmlns:p14="http://schemas.microsoft.com/office/powerpoint/2010/main" val="1648489107"/>
+      </p:ext>
+    </p:extLst>
+  </p:cSld>
+  <p:clrMapOvr>
+    <a:masterClrMapping/>
+  </p:clrMapOvr>
+  <p:transition spd="slow"/>
+  <p:timing>
+    <p:tnLst>
+      <p:par>
+        <p:cTn id="1" dur="indefinite" restart="never" nodeType="tmRoot"/>
+      </p:par>
+    </p:tnLst>
+  </p:timing>
+</p:sld>
+</file>
+
+<file path=ppt/slides/slide21.xml><?xml version="1.0" encoding="utf-8"?>
+<p:sld xmlns:a="http://schemas.openxmlformats.org/drawingml/2006/main" xmlns:r="http://schemas.openxmlformats.org/officeDocument/2006/relationships" xmlns:p="http://schemas.openxmlformats.org/presentationml/2006/main">
+  <p:cSld>
+    <p:spTree>
+      <p:nvGrpSpPr>
+        <p:cNvPr id="1" name=""/>
+        <p:cNvGrpSpPr/>
+        <p:nvPr/>
+      </p:nvGrpSpPr>
+      <p:grpSpPr>
+        <a:xfrm>
+          <a:off x="0" y="0"/>
+          <a:ext cx="0" cy="0"/>
+          <a:chOff x="0" y="0"/>
+          <a:chExt cx="0" cy="0"/>
+        </a:xfrm>
+      </p:grpSpPr>
+      <p:sp>
+        <p:nvSpPr>
           <p:cNvPr id="5122" name="Text Box 2"/>
           <p:cNvSpPr txBox="1">
             <a:spLocks noChangeArrowheads="1"/>
@@ -18724,7 +19139,420 @@
 </p:sld>
 </file>
 
-<file path=ppt/slides/slide21.xml><?xml version="1.0" encoding="utf-8"?>
+<file path=ppt/slides/slide22.xml><?xml version="1.0" encoding="utf-8"?>
+<p:sld xmlns:a="http://schemas.openxmlformats.org/drawingml/2006/main" xmlns:r="http://schemas.openxmlformats.org/officeDocument/2006/relationships" xmlns:p="http://schemas.openxmlformats.org/presentationml/2006/main">
+  <p:cSld>
+    <p:spTree>
+      <p:nvGrpSpPr>
+        <p:cNvPr id="1" name=""/>
+        <p:cNvGrpSpPr/>
+        <p:nvPr/>
+      </p:nvGrpSpPr>
+      <p:grpSpPr>
+        <a:xfrm>
+          <a:off x="0" y="0"/>
+          <a:ext cx="0" cy="0"/>
+          <a:chOff x="0" y="0"/>
+          <a:chExt cx="0" cy="0"/>
+        </a:xfrm>
+      </p:grpSpPr>
+      <p:sp>
+        <p:nvSpPr>
+          <p:cNvPr id="4098" name="Rectangle 2"/>
+          <p:cNvSpPr>
+            <a:spLocks noGrp="1" noChangeArrowheads="1"/>
+          </p:cNvSpPr>
+          <p:nvPr>
+            <p:ph type="ctrTitle"/>
+          </p:nvPr>
+        </p:nvSpPr>
+        <p:spPr>
+          <a:xfrm>
+            <a:off x="395288" y="1628775"/>
+            <a:ext cx="8569325" cy="1144588"/>
+          </a:xfrm>
+        </p:spPr>
+        <p:txBody>
+          <a:bodyPr/>
+          <a:lstStyle/>
+          <a:p>
+            <a:pPr eaLnBrk="1" hangingPunct="1"/>
+            <a:r>
+              <a:rPr lang="sr-Cyrl-RS" altLang="en-US" sz="5400" dirty="0" smtClean="0">
+                <a:solidFill>
+                  <a:srgbClr val="3366FF"/>
+                </a:solidFill>
+              </a:rPr>
+              <a:t>Предефинисани </a:t>
+            </a:r>
+            <a:r>
+              <a:rPr lang="en-US" altLang="en-US" sz="5400" dirty="0" smtClean="0">
+                <a:solidFill>
+                  <a:srgbClr val="3366FF"/>
+                </a:solidFill>
+              </a:rPr>
+              <a:t/>
+            </a:r>
+            <a:br>
+              <a:rPr lang="en-US" altLang="en-US" sz="5400" dirty="0" smtClean="0">
+                <a:solidFill>
+                  <a:srgbClr val="3366FF"/>
+                </a:solidFill>
+              </a:rPr>
+            </a:br>
+            <a:r>
+              <a:rPr lang="sr-Cyrl-RS" altLang="en-US" sz="5400" dirty="0" smtClean="0">
+                <a:solidFill>
+                  <a:srgbClr val="3366FF"/>
+                </a:solidFill>
+              </a:rPr>
+              <a:t>типови и објекти </a:t>
+            </a:r>
+            <a:br>
+              <a:rPr lang="sr-Cyrl-RS" altLang="en-US" sz="5400" dirty="0" smtClean="0">
+                <a:solidFill>
+                  <a:srgbClr val="3366FF"/>
+                </a:solidFill>
+              </a:rPr>
+            </a:br>
+            <a:r>
+              <a:rPr lang="sr-Cyrl-RS" altLang="en-US" sz="5400" dirty="0" smtClean="0">
+                <a:solidFill>
+                  <a:srgbClr val="3366FF"/>
+                </a:solidFill>
+              </a:rPr>
+              <a:t>у програмском језику Јава</a:t>
+            </a:r>
+            <a:endParaRPr lang="sr-Latn-CS" altLang="en-US" sz="5400" dirty="0" smtClean="0">
+              <a:solidFill>
+                <a:srgbClr val="3366FF"/>
+              </a:solidFill>
+            </a:endParaRPr>
+          </a:p>
+        </p:txBody>
+      </p:sp>
+      <p:sp>
+        <p:nvSpPr>
+          <p:cNvPr id="5" name="Rectangle 3"/>
+          <p:cNvSpPr txBox="1">
+            <a:spLocks noChangeArrowheads="1"/>
+          </p:cNvSpPr>
+          <p:nvPr/>
+        </p:nvSpPr>
+        <p:spPr bwMode="auto">
+          <a:xfrm>
+            <a:off x="3563888" y="3356992"/>
+            <a:ext cx="5110162" cy="1752600"/>
+          </a:xfrm>
+          <a:prstGeom prst="rect">
+            <a:avLst/>
+          </a:prstGeom>
+          <a:noFill/>
+          <a:ln>
+            <a:noFill/>
+          </a:ln>
+          <a:extLst>
+            <a:ext uri="{909E8E84-426E-40DD-AFC4-6F175D3DCCD1}">
+              <a14:hiddenFill xmlns:a14="http://schemas.microsoft.com/office/drawing/2010/main">
+                <a:solidFill>
+                  <a:srgbClr val="FFFFFF"/>
+                </a:solidFill>
+              </a14:hiddenFill>
+            </a:ext>
+            <a:ext uri="{91240B29-F687-4F45-9708-019B960494DF}">
+              <a14:hiddenLine xmlns:a14="http://schemas.microsoft.com/office/drawing/2010/main" w="9525">
+                <a:solidFill>
+                  <a:srgbClr val="000000"/>
+                </a:solidFill>
+                <a:miter lim="800000"/>
+                <a:headEnd/>
+                <a:tailEnd/>
+              </a14:hiddenLine>
+            </a:ext>
+          </a:extLst>
+        </p:spPr>
+        <p:txBody>
+          <a:bodyPr vert="horz" wrap="square" lIns="91440" tIns="45720" rIns="91440" bIns="45720" numCol="1" anchor="t" anchorCtr="0" compatLnSpc="1">
+            <a:prstTxWarp prst="textNoShape">
+              <a:avLst/>
+            </a:prstTxWarp>
+          </a:bodyPr>
+          <a:lstStyle>
+            <a:lvl1pPr marL="0" indent="0" algn="r" rtl="0" eaLnBrk="0" fontAlgn="base" hangingPunct="0">
+              <a:spcBef>
+                <a:spcPct val="20000"/>
+              </a:spcBef>
+              <a:spcAft>
+                <a:spcPct val="0"/>
+              </a:spcAft>
+              <a:buClr>
+                <a:schemeClr val="accent1"/>
+              </a:buClr>
+              <a:buFont typeface="Wingdings" panose="05000000000000000000" pitchFamily="2" charset="2"/>
+              <a:buNone/>
+              <a:defRPr sz="3200">
+                <a:solidFill>
+                  <a:schemeClr val="tx1"/>
+                </a:solidFill>
+                <a:latin typeface="+mn-lt"/>
+                <a:ea typeface="+mn-ea"/>
+                <a:cs typeface="+mn-cs"/>
+              </a:defRPr>
+            </a:lvl1pPr>
+            <a:lvl2pPr marL="742950" indent="-285750" algn="l" rtl="0" eaLnBrk="0" fontAlgn="base" hangingPunct="0">
+              <a:spcBef>
+                <a:spcPct val="20000"/>
+              </a:spcBef>
+              <a:spcAft>
+                <a:spcPct val="0"/>
+              </a:spcAft>
+              <a:buClr>
+                <a:schemeClr val="accent1"/>
+              </a:buClr>
+              <a:buFont typeface="Wingdings" panose="05000000000000000000" pitchFamily="2" charset="2"/>
+              <a:buChar char="¡"/>
+              <a:defRPr sz="2700">
+                <a:solidFill>
+                  <a:schemeClr val="tx1"/>
+                </a:solidFill>
+                <a:latin typeface="+mn-lt"/>
+              </a:defRPr>
+            </a:lvl2pPr>
+            <a:lvl3pPr marL="1143000" indent="-228600" algn="l" rtl="0" eaLnBrk="0" fontAlgn="base" hangingPunct="0">
+              <a:spcBef>
+                <a:spcPct val="20000"/>
+              </a:spcBef>
+              <a:spcAft>
+                <a:spcPct val="0"/>
+              </a:spcAft>
+              <a:buClr>
+                <a:schemeClr val="accent1"/>
+              </a:buClr>
+              <a:buFont typeface="Wingdings" panose="05000000000000000000" pitchFamily="2" charset="2"/>
+              <a:buChar char="l"/>
+              <a:defRPr sz="2300">
+                <a:solidFill>
+                  <a:schemeClr val="tx1"/>
+                </a:solidFill>
+                <a:latin typeface="+mn-lt"/>
+              </a:defRPr>
+            </a:lvl3pPr>
+            <a:lvl4pPr marL="1600200" indent="-228600" algn="l" rtl="0" eaLnBrk="0" fontAlgn="base" hangingPunct="0">
+              <a:spcBef>
+                <a:spcPct val="20000"/>
+              </a:spcBef>
+              <a:spcAft>
+                <a:spcPct val="0"/>
+              </a:spcAft>
+              <a:buClr>
+                <a:schemeClr val="accent1"/>
+              </a:buClr>
+              <a:buChar char="•"/>
+              <a:defRPr sz="2000">
+                <a:solidFill>
+                  <a:schemeClr val="tx1"/>
+                </a:solidFill>
+                <a:latin typeface="+mn-lt"/>
+              </a:defRPr>
+            </a:lvl4pPr>
+            <a:lvl5pPr marL="2057400" indent="-228600" algn="l" rtl="0" eaLnBrk="0" fontAlgn="base" hangingPunct="0">
+              <a:spcBef>
+                <a:spcPct val="20000"/>
+              </a:spcBef>
+              <a:spcAft>
+                <a:spcPct val="0"/>
+              </a:spcAft>
+              <a:buClr>
+                <a:schemeClr val="accent1"/>
+              </a:buClr>
+              <a:buFont typeface="Wingdings" panose="05000000000000000000" pitchFamily="2" charset="2"/>
+              <a:buChar char=""/>
+              <a:defRPr sz="2000">
+                <a:solidFill>
+                  <a:schemeClr val="tx1"/>
+                </a:solidFill>
+                <a:latin typeface="+mn-lt"/>
+              </a:defRPr>
+            </a:lvl5pPr>
+            <a:lvl6pPr marL="2514600" indent="-228600" algn="l" rtl="0" fontAlgn="base">
+              <a:spcBef>
+                <a:spcPct val="20000"/>
+              </a:spcBef>
+              <a:spcAft>
+                <a:spcPct val="0"/>
+              </a:spcAft>
+              <a:buClr>
+                <a:schemeClr val="accent1"/>
+              </a:buClr>
+              <a:buFont typeface="Wingdings" pitchFamily="2" charset="2"/>
+              <a:buChar char=""/>
+              <a:defRPr sz="2000">
+                <a:solidFill>
+                  <a:schemeClr val="tx1"/>
+                </a:solidFill>
+                <a:latin typeface="+mn-lt"/>
+              </a:defRPr>
+            </a:lvl6pPr>
+            <a:lvl7pPr marL="2971800" indent="-228600" algn="l" rtl="0" fontAlgn="base">
+              <a:spcBef>
+                <a:spcPct val="20000"/>
+              </a:spcBef>
+              <a:spcAft>
+                <a:spcPct val="0"/>
+              </a:spcAft>
+              <a:buClr>
+                <a:schemeClr val="accent1"/>
+              </a:buClr>
+              <a:buFont typeface="Wingdings" pitchFamily="2" charset="2"/>
+              <a:buChar char=""/>
+              <a:defRPr sz="2000">
+                <a:solidFill>
+                  <a:schemeClr val="tx1"/>
+                </a:solidFill>
+                <a:latin typeface="+mn-lt"/>
+              </a:defRPr>
+            </a:lvl7pPr>
+            <a:lvl8pPr marL="3429000" indent="-228600" algn="l" rtl="0" fontAlgn="base">
+              <a:spcBef>
+                <a:spcPct val="20000"/>
+              </a:spcBef>
+              <a:spcAft>
+                <a:spcPct val="0"/>
+              </a:spcAft>
+              <a:buClr>
+                <a:schemeClr val="accent1"/>
+              </a:buClr>
+              <a:buFont typeface="Wingdings" pitchFamily="2" charset="2"/>
+              <a:buChar char=""/>
+              <a:defRPr sz="2000">
+                <a:solidFill>
+                  <a:schemeClr val="tx1"/>
+                </a:solidFill>
+                <a:latin typeface="+mn-lt"/>
+              </a:defRPr>
+            </a:lvl8pPr>
+            <a:lvl9pPr marL="3886200" indent="-228600" algn="l" rtl="0" fontAlgn="base">
+              <a:spcBef>
+                <a:spcPct val="20000"/>
+              </a:spcBef>
+              <a:spcAft>
+                <a:spcPct val="0"/>
+              </a:spcAft>
+              <a:buClr>
+                <a:schemeClr val="accent1"/>
+              </a:buClr>
+              <a:buFont typeface="Wingdings" pitchFamily="2" charset="2"/>
+              <a:buChar char=""/>
+              <a:defRPr sz="2000">
+                <a:solidFill>
+                  <a:schemeClr val="tx1"/>
+                </a:solidFill>
+                <a:latin typeface="+mn-lt"/>
+              </a:defRPr>
+            </a:lvl9pPr>
+          </a:lstStyle>
+          <a:p>
+            <a:pPr eaLnBrk="1" hangingPunct="1"/>
+            <a:r>
+              <a:rPr lang="sr-Cyrl-RS" altLang="en-US" kern="0" dirty="0" smtClean="0">
+                <a:solidFill>
+                  <a:srgbClr val="993300"/>
+                </a:solidFill>
+                <a:latin typeface="Times New Roman" panose="02020603050405020304" pitchFamily="18" charset="0"/>
+                <a:cs typeface="Times New Roman" panose="02020603050405020304" pitchFamily="18" charset="0"/>
+              </a:rPr>
+              <a:t>Владимир Филиповић</a:t>
+            </a:r>
+            <a:endParaRPr lang="en-US" altLang="en-US" kern="0" dirty="0" smtClean="0">
+              <a:solidFill>
+                <a:srgbClr val="993300"/>
+              </a:solidFill>
+              <a:latin typeface="Times New Roman" panose="02020603050405020304" pitchFamily="18" charset="0"/>
+              <a:cs typeface="Times New Roman" panose="02020603050405020304" pitchFamily="18" charset="0"/>
+            </a:endParaRPr>
+          </a:p>
+          <a:p>
+            <a:pPr eaLnBrk="1" hangingPunct="1"/>
+            <a:r>
+              <a:rPr lang="sr-Latn-CS" altLang="en-US" kern="0" dirty="0" smtClean="0">
+                <a:hlinkClick r:id="rId2"/>
+              </a:rPr>
+              <a:t>vladaf@matf.bg.ac.</a:t>
+            </a:r>
+            <a:r>
+              <a:rPr lang="en-US" altLang="en-US" kern="0" dirty="0" err="1" smtClean="0">
+                <a:hlinkClick r:id="rId2"/>
+              </a:rPr>
+              <a:t>rs</a:t>
+            </a:r>
+            <a:endParaRPr lang="sr-Latn-RS" altLang="en-US" kern="0" dirty="0" smtClean="0"/>
+          </a:p>
+          <a:p>
+            <a:pPr eaLnBrk="1" hangingPunct="1"/>
+            <a:r>
+              <a:rPr lang="sr-Cyrl-RS" altLang="en-US" kern="0" dirty="0" smtClean="0">
+                <a:solidFill>
+                  <a:srgbClr val="993300"/>
+                </a:solidFill>
+                <a:latin typeface="Times New Roman" panose="02020603050405020304" pitchFamily="18" charset="0"/>
+                <a:cs typeface="Times New Roman" panose="02020603050405020304" pitchFamily="18" charset="0"/>
+              </a:rPr>
+              <a:t>Александар Картељ</a:t>
+            </a:r>
+            <a:endParaRPr lang="en-US" altLang="en-US" kern="0" dirty="0" smtClean="0">
+              <a:solidFill>
+                <a:srgbClr val="993300"/>
+              </a:solidFill>
+              <a:latin typeface="Times New Roman" panose="02020603050405020304" pitchFamily="18" charset="0"/>
+              <a:cs typeface="Times New Roman" panose="02020603050405020304" pitchFamily="18" charset="0"/>
+            </a:endParaRPr>
+          </a:p>
+          <a:p>
+            <a:pPr eaLnBrk="1" hangingPunct="1"/>
+            <a:r>
+              <a:rPr lang="en-US" altLang="en-US" kern="0" dirty="0" smtClean="0">
+                <a:hlinkClick r:id="rId3"/>
+              </a:rPr>
+              <a:t>k</a:t>
+            </a:r>
+            <a:r>
+              <a:rPr lang="sr-Latn-RS" altLang="en-US" kern="0" dirty="0" smtClean="0">
+                <a:hlinkClick r:id="rId3"/>
+              </a:rPr>
+              <a:t>artelj</a:t>
+            </a:r>
+            <a:r>
+              <a:rPr lang="en-US" altLang="en-US" kern="0" dirty="0" smtClean="0">
+                <a:hlinkClick r:id="rId3"/>
+              </a:rPr>
+              <a:t>@matf.bg.ac.rs</a:t>
+            </a:r>
+            <a:endParaRPr lang="en-US" altLang="en-US" kern="0" dirty="0"/>
+          </a:p>
+        </p:txBody>
+      </p:sp>
+    </p:spTree>
+    <p:extLst>
+      <p:ext uri="{BB962C8B-B14F-4D97-AF65-F5344CB8AC3E}">
+        <p14:creationId xmlns:p14="http://schemas.microsoft.com/office/powerpoint/2010/main" val="2298026132"/>
+      </p:ext>
+    </p:extLst>
+  </p:cSld>
+  <p:clrMapOvr>
+    <a:masterClrMapping/>
+  </p:clrMapOvr>
+  <p:transition spd="slow"/>
+  <p:timing>
+    <p:tnLst>
+      <p:par>
+        <p:cTn id="1" dur="indefinite" restart="never" nodeType="tmRoot"/>
+      </p:par>
+    </p:tnLst>
+  </p:timing>
+</p:sld>
+</file>
+
+<file path=ppt/slides/slide23.xml><?xml version="1.0" encoding="utf-8"?>
 <p:sld xmlns:a="http://schemas.openxmlformats.org/drawingml/2006/main" xmlns:r="http://schemas.openxmlformats.org/officeDocument/2006/relationships" xmlns:p="http://schemas.openxmlformats.org/presentationml/2006/main">
   <p:cSld>
     <p:spTree>
@@ -20002,7 +20830,7 @@
 </p:sld>
 </file>
 
-<file path=ppt/slides/slide22.xml><?xml version="1.0" encoding="utf-8"?>
+<file path=ppt/slides/slide24.xml><?xml version="1.0" encoding="utf-8"?>
 <p:sld xmlns:a="http://schemas.openxmlformats.org/drawingml/2006/main" xmlns:r="http://schemas.openxmlformats.org/officeDocument/2006/relationships" xmlns:p="http://schemas.openxmlformats.org/presentationml/2006/main">
   <p:cSld>
     <p:spTree>
@@ -21575,7 +22403,7 @@
 </p:sld>
 </file>
 
-<file path=ppt/slides/slide23.xml><?xml version="1.0" encoding="utf-8"?>
+<file path=ppt/slides/slide25.xml><?xml version="1.0" encoding="utf-8"?>
 <p:sld xmlns:a="http://schemas.openxmlformats.org/drawingml/2006/main" xmlns:r="http://schemas.openxmlformats.org/officeDocument/2006/relationships" xmlns:p="http://schemas.openxmlformats.org/presentationml/2006/main">
   <p:cSld>
     <p:spTree>

</xml_diff>